<commit_message>
Update DATOS COVID Chile 2022 05 07.pptx
</commit_message>
<xml_diff>
--- a/DATOS COVID Chile 2022 05 07.pptx
+++ b/DATOS COVID Chile 2022 05 07.pptx
@@ -28,10 +28,10 @@
     <p:sldId id="407" r:id="rId19"/>
     <p:sldId id="481" r:id="rId20"/>
     <p:sldId id="482" r:id="rId21"/>
-    <p:sldId id="483" r:id="rId22"/>
-    <p:sldId id="470" r:id="rId23"/>
-    <p:sldId id="492" r:id="rId24"/>
-    <p:sldId id="491" r:id="rId25"/>
+    <p:sldId id="470" r:id="rId22"/>
+    <p:sldId id="492" r:id="rId23"/>
+    <p:sldId id="491" r:id="rId24"/>
+    <p:sldId id="483" r:id="rId25"/>
     <p:sldId id="424" r:id="rId26"/>
   </p:sldIdLst>
   <p:sldSz cx="12192000" cy="6858000"/>
@@ -5110,10 +5110,10 @@
       </p:sp>
       <p:pic>
         <p:nvPicPr>
-          <p:cNvPr id="3" name="Picture 2">
-            <a:extLst>
-              <a:ext uri="{FF2B5EF4-FFF2-40B4-BE49-F238E27FC236}">
-                <a16:creationId xmlns:a16="http://schemas.microsoft.com/office/drawing/2014/main" id="{F4394349-9DBB-4C04-CC07-46E2A2729E36}"/>
+          <p:cNvPr id="2" name="Picture 1">
+            <a:extLst>
+              <a:ext uri="{FF2B5EF4-FFF2-40B4-BE49-F238E27FC236}">
+                <a16:creationId xmlns:a16="http://schemas.microsoft.com/office/drawing/2014/main" id="{C47DA0A3-DC18-7246-874F-220357A9CF01}"/>
               </a:ext>
             </a:extLst>
           </p:cNvPr>
@@ -5130,8 +5130,8 @@
         </p:blipFill>
         <p:spPr>
           <a:xfrm>
-            <a:off x="2192420" y="712975"/>
-            <a:ext cx="7807159" cy="5747481"/>
+            <a:off x="2107356" y="712975"/>
+            <a:ext cx="7977288" cy="5809547"/>
           </a:xfrm>
           <a:prstGeom prst="rect">
             <a:avLst/>
@@ -6728,51 +6728,12 @@
           <a:chExt cx="0" cy="0"/>
         </a:xfrm>
       </p:grpSpPr>
-      <p:sp>
-        <p:nvSpPr>
-          <p:cNvPr id="3" name="TextBox 2">
-            <a:extLst>
-              <a:ext uri="{FF2B5EF4-FFF2-40B4-BE49-F238E27FC236}">
-                <a16:creationId xmlns:a16="http://schemas.microsoft.com/office/drawing/2014/main" id="{1BFE40F7-FB73-FEAE-B569-AB700FD1A2C9}"/>
-              </a:ext>
-            </a:extLst>
-          </p:cNvPr>
-          <p:cNvSpPr txBox="1"/>
-          <p:nvPr/>
-        </p:nvSpPr>
-        <p:spPr>
-          <a:xfrm>
-            <a:off x="2236610" y="0"/>
-            <a:ext cx="7718780" cy="584775"/>
-          </a:xfrm>
-          <a:prstGeom prst="rect">
-            <a:avLst/>
-          </a:prstGeom>
-          <a:noFill/>
-        </p:spPr>
-        <p:txBody>
-          <a:bodyPr wrap="none" rtlCol="0">
-            <a:spAutoFit/>
-          </a:bodyPr>
-          <a:lstStyle/>
-          <a:p>
-            <a:r>
-              <a:rPr lang="en-CL" sz="3200" dirty="0"/>
-              <a:t>Cobertura de vacunación </a:t>
-            </a:r>
-            <a:r>
-              <a:rPr lang="en-CL" sz="3200" b="1" dirty="0"/>
-              <a:t>en últimos 6 meses</a:t>
-            </a:r>
-          </a:p>
-        </p:txBody>
-      </p:sp>
       <p:pic>
         <p:nvPicPr>
-          <p:cNvPr id="2" name="Picture 1">
-            <a:extLst>
-              <a:ext uri="{FF2B5EF4-FFF2-40B4-BE49-F238E27FC236}">
-                <a16:creationId xmlns:a16="http://schemas.microsoft.com/office/drawing/2014/main" id="{5D3FB194-BE90-9413-2AA5-393EA4C58E1B}"/>
+          <p:cNvPr id="3" name="Picture 2">
+            <a:extLst>
+              <a:ext uri="{FF2B5EF4-FFF2-40B4-BE49-F238E27FC236}">
+                <a16:creationId xmlns:a16="http://schemas.microsoft.com/office/drawing/2014/main" id="{67027C86-1AB9-C60E-9CC0-6ADF6254F6AE}"/>
               </a:ext>
             </a:extLst>
           </p:cNvPr>
@@ -6789,18 +6750,170 @@
         </p:blipFill>
         <p:spPr>
           <a:xfrm>
-            <a:off x="1746763" y="720242"/>
-            <a:ext cx="8698474" cy="5748292"/>
+            <a:off x="1114844" y="558800"/>
+            <a:ext cx="9855200" cy="5740400"/>
           </a:xfrm>
           <a:prstGeom prst="rect">
             <a:avLst/>
           </a:prstGeom>
         </p:spPr>
       </p:pic>
+      <p:sp>
+        <p:nvSpPr>
+          <p:cNvPr id="9" name="TextBox 8">
+            <a:extLst>
+              <a:ext uri="{FF2B5EF4-FFF2-40B4-BE49-F238E27FC236}">
+                <a16:creationId xmlns:a16="http://schemas.microsoft.com/office/drawing/2014/main" id="{22433A70-977D-C840-9BCB-9ECF9B80CB77}"/>
+              </a:ext>
+            </a:extLst>
+          </p:cNvPr>
+          <p:cNvSpPr txBox="1"/>
+          <p:nvPr/>
+        </p:nvSpPr>
+        <p:spPr>
+          <a:xfrm>
+            <a:off x="-73478" y="0"/>
+            <a:ext cx="12338956" cy="569387"/>
+          </a:xfrm>
+          <a:prstGeom prst="rect">
+            <a:avLst/>
+          </a:prstGeom>
+          <a:noFill/>
+        </p:spPr>
+        <p:txBody>
+          <a:bodyPr wrap="square" rtlCol="0">
+            <a:spAutoFit/>
+          </a:bodyPr>
+          <a:lstStyle/>
+          <a:p>
+            <a:pPr algn="ctr"/>
+            <a:r>
+              <a:rPr lang="en-US" sz="3100" dirty="0" err="1"/>
+              <a:t>Nuevas</a:t>
+            </a:r>
+            <a:r>
+              <a:rPr lang="en-US" sz="3100" dirty="0"/>
+              <a:t> </a:t>
+            </a:r>
+            <a:r>
+              <a:rPr lang="en-US" sz="3100" dirty="0" err="1"/>
+              <a:t>vacunas</a:t>
+            </a:r>
+            <a:r>
+              <a:rPr lang="en-US" sz="3100" dirty="0"/>
+              <a:t> </a:t>
+            </a:r>
+            <a:r>
+              <a:rPr lang="en-US" sz="3100" dirty="0" err="1"/>
+              <a:t>semanales</a:t>
+            </a:r>
+            <a:endParaRPr lang="en-US" sz="3100" dirty="0"/>
+          </a:p>
+        </p:txBody>
+      </p:sp>
+      <p:sp>
+        <p:nvSpPr>
+          <p:cNvPr id="5" name="TextBox 4">
+            <a:extLst>
+              <a:ext uri="{FF2B5EF4-FFF2-40B4-BE49-F238E27FC236}">
+                <a16:creationId xmlns:a16="http://schemas.microsoft.com/office/drawing/2014/main" id="{AE60033C-48B3-1E42-A180-100FEDC8D62B}"/>
+              </a:ext>
+            </a:extLst>
+          </p:cNvPr>
+          <p:cNvSpPr txBox="1"/>
+          <p:nvPr/>
+        </p:nvSpPr>
+        <p:spPr>
+          <a:xfrm>
+            <a:off x="160256" y="6447934"/>
+            <a:ext cx="5882188" cy="369332"/>
+          </a:xfrm>
+          <a:prstGeom prst="rect">
+            <a:avLst/>
+          </a:prstGeom>
+          <a:noFill/>
+        </p:spPr>
+        <p:txBody>
+          <a:bodyPr wrap="none" rtlCol="0">
+            <a:spAutoFit/>
+          </a:bodyPr>
+          <a:lstStyle/>
+          <a:p>
+            <a:r>
+              <a:rPr lang="en-US" dirty="0"/>
+              <a:t>Fuente: </a:t>
+            </a:r>
+            <a:r>
+              <a:rPr lang="en-US" dirty="0" err="1"/>
+              <a:t>Repositorio</a:t>
+            </a:r>
+            <a:r>
+              <a:rPr lang="en-US" dirty="0"/>
+              <a:t> de </a:t>
+            </a:r>
+            <a:r>
+              <a:rPr lang="en-US" dirty="0" err="1"/>
+              <a:t>Datos</a:t>
+            </a:r>
+            <a:r>
+              <a:rPr lang="en-US" dirty="0"/>
+              <a:t> COVID19, </a:t>
+            </a:r>
+            <a:r>
+              <a:rPr lang="en-US" dirty="0" err="1"/>
+              <a:t>Ministerio</a:t>
+            </a:r>
+            <a:r>
+              <a:rPr lang="en-US" dirty="0"/>
+              <a:t> de </a:t>
+            </a:r>
+            <a:r>
+              <a:rPr lang="en-US" dirty="0" err="1"/>
+              <a:t>Ciencia</a:t>
+            </a:r>
+            <a:endParaRPr lang="en-US" dirty="0"/>
+          </a:p>
+        </p:txBody>
+      </p:sp>
+      <p:sp>
+        <p:nvSpPr>
+          <p:cNvPr id="2" name="TextBox 1">
+            <a:extLst>
+              <a:ext uri="{FF2B5EF4-FFF2-40B4-BE49-F238E27FC236}">
+                <a16:creationId xmlns:a16="http://schemas.microsoft.com/office/drawing/2014/main" id="{FE913D83-78EC-F64F-98C6-1C151ADBA8A9}"/>
+              </a:ext>
+            </a:extLst>
+          </p:cNvPr>
+          <p:cNvSpPr txBox="1"/>
+          <p:nvPr/>
+        </p:nvSpPr>
+        <p:spPr>
+          <a:xfrm>
+            <a:off x="4751176" y="833401"/>
+            <a:ext cx="1968809" cy="461665"/>
+          </a:xfrm>
+          <a:prstGeom prst="rect">
+            <a:avLst/>
+          </a:prstGeom>
+          <a:noFill/>
+        </p:spPr>
+        <p:txBody>
+          <a:bodyPr wrap="none" rtlCol="0">
+            <a:spAutoFit/>
+          </a:bodyPr>
+          <a:lstStyle/>
+          <a:p>
+            <a:r>
+              <a:rPr lang="en-CL" sz="2400" dirty="0"/>
+              <a:t>18 o más años</a:t>
+            </a:r>
+          </a:p>
+        </p:txBody>
+      </p:sp>
     </p:spTree>
     <p:extLst>
       <p:ext uri="{BB962C8B-B14F-4D97-AF65-F5344CB8AC3E}">
-        <p14:creationId xmlns:p14="http://schemas.microsoft.com/office/powerpoint/2010/main" val="58329169"/>
+        <p14:creationId xmlns:p14="http://schemas.microsoft.com/office/powerpoint/2010/main" val="2319474179"/>
       </p:ext>
     </p:extLst>
   </p:cSld>
@@ -6832,7 +6945,7 @@
           <p:cNvPr id="3" name="Picture 2">
             <a:extLst>
               <a:ext uri="{FF2B5EF4-FFF2-40B4-BE49-F238E27FC236}">
-                <a16:creationId xmlns:a16="http://schemas.microsoft.com/office/drawing/2014/main" id="{67027C86-1AB9-C60E-9CC0-6ADF6254F6AE}"/>
+                <a16:creationId xmlns:a16="http://schemas.microsoft.com/office/drawing/2014/main" id="{4B7D297A-4D89-6AD4-AB14-56BAF61E359E}"/>
               </a:ext>
             </a:extLst>
           </p:cNvPr>
@@ -6849,8 +6962,8 @@
         </p:blipFill>
         <p:spPr>
           <a:xfrm>
-            <a:off x="1114844" y="558800"/>
-            <a:ext cx="9855200" cy="5740400"/>
+            <a:off x="1206500" y="584200"/>
+            <a:ext cx="9779000" cy="5689600"/>
           </a:xfrm>
           <a:prstGeom prst="rect">
             <a:avLst/>
@@ -6888,7 +7001,7 @@
             <a:pPr algn="ctr"/>
             <a:r>
               <a:rPr lang="en-US" sz="3100" dirty="0" err="1"/>
-              <a:t>Nuevas</a:t>
+              <a:t>Vacunados</a:t>
             </a:r>
             <a:r>
               <a:rPr lang="en-US" sz="3100" dirty="0"/>
@@ -6896,15 +7009,7 @@
             </a:r>
             <a:r>
               <a:rPr lang="en-US" sz="3100" dirty="0" err="1"/>
-              <a:t>vacunas</a:t>
-            </a:r>
-            <a:r>
-              <a:rPr lang="en-US" sz="3100" dirty="0"/>
-              <a:t> </a:t>
-            </a:r>
-            <a:r>
-              <a:rPr lang="en-US" sz="3100" dirty="0" err="1"/>
-              <a:t>semanales</a:t>
+              <a:t>acumulados</a:t>
             </a:r>
             <a:endParaRPr lang="en-US" sz="3100" dirty="0"/>
           </a:p>
@@ -6988,7 +7093,7 @@
         </p:nvSpPr>
         <p:spPr>
           <a:xfrm>
-            <a:off x="4751176" y="833401"/>
+            <a:off x="5058039" y="444672"/>
             <a:ext cx="1968809" cy="461665"/>
           </a:xfrm>
           <a:prstGeom prst="rect">
@@ -7009,10 +7114,127 @@
           </a:p>
         </p:txBody>
       </p:sp>
+      <p:sp>
+        <p:nvSpPr>
+          <p:cNvPr id="6" name="TextBox 5">
+            <a:extLst>
+              <a:ext uri="{FF2B5EF4-FFF2-40B4-BE49-F238E27FC236}">
+                <a16:creationId xmlns:a16="http://schemas.microsoft.com/office/drawing/2014/main" id="{F3DAB039-A99C-1683-729A-B620F140DE6F}"/>
+              </a:ext>
+            </a:extLst>
+          </p:cNvPr>
+          <p:cNvSpPr txBox="1"/>
+          <p:nvPr/>
+        </p:nvSpPr>
+        <p:spPr>
+          <a:xfrm>
+            <a:off x="4358244" y="5438899"/>
+            <a:ext cx="986167" cy="369332"/>
+          </a:xfrm>
+          <a:prstGeom prst="rect">
+            <a:avLst/>
+          </a:prstGeom>
+          <a:noFill/>
+        </p:spPr>
+        <p:txBody>
+          <a:bodyPr wrap="none" rtlCol="0">
+            <a:spAutoFit/>
+          </a:bodyPr>
+          <a:lstStyle/>
+          <a:p>
+            <a:r>
+              <a:rPr lang="en-CL" dirty="0">
+                <a:solidFill>
+                  <a:schemeClr val="bg1"/>
+                </a:solidFill>
+              </a:rPr>
+              <a:t>Primario</a:t>
+            </a:r>
+          </a:p>
+        </p:txBody>
+      </p:sp>
+      <p:sp>
+        <p:nvSpPr>
+          <p:cNvPr id="8" name="TextBox 7">
+            <a:extLst>
+              <a:ext uri="{FF2B5EF4-FFF2-40B4-BE49-F238E27FC236}">
+                <a16:creationId xmlns:a16="http://schemas.microsoft.com/office/drawing/2014/main" id="{EF1C9CD5-305C-E27D-9785-A6850911553F}"/>
+              </a:ext>
+            </a:extLst>
+          </p:cNvPr>
+          <p:cNvSpPr txBox="1"/>
+          <p:nvPr/>
+        </p:nvSpPr>
+        <p:spPr>
+          <a:xfrm>
+            <a:off x="7414985" y="5438899"/>
+            <a:ext cx="1185004" cy="369332"/>
+          </a:xfrm>
+          <a:prstGeom prst="rect">
+            <a:avLst/>
+          </a:prstGeom>
+          <a:noFill/>
+        </p:spPr>
+        <p:txBody>
+          <a:bodyPr wrap="none" rtlCol="0">
+            <a:spAutoFit/>
+          </a:bodyPr>
+          <a:lstStyle/>
+          <a:p>
+            <a:r>
+              <a:rPr lang="en-CL" dirty="0">
+                <a:solidFill>
+                  <a:schemeClr val="bg1"/>
+                </a:solidFill>
+              </a:rPr>
+              <a:t>Refuerzo 1</a:t>
+            </a:r>
+          </a:p>
+        </p:txBody>
+      </p:sp>
+      <p:sp>
+        <p:nvSpPr>
+          <p:cNvPr id="10" name="TextBox 9">
+            <a:extLst>
+              <a:ext uri="{FF2B5EF4-FFF2-40B4-BE49-F238E27FC236}">
+                <a16:creationId xmlns:a16="http://schemas.microsoft.com/office/drawing/2014/main" id="{FBC66748-E2EF-41D5-A9CC-B3DFE5F373A8}"/>
+              </a:ext>
+            </a:extLst>
+          </p:cNvPr>
+          <p:cNvSpPr txBox="1"/>
+          <p:nvPr/>
+        </p:nvSpPr>
+        <p:spPr>
+          <a:xfrm>
+            <a:off x="9616189" y="5438899"/>
+            <a:ext cx="1185004" cy="369332"/>
+          </a:xfrm>
+          <a:prstGeom prst="rect">
+            <a:avLst/>
+          </a:prstGeom>
+          <a:noFill/>
+        </p:spPr>
+        <p:txBody>
+          <a:bodyPr wrap="none" rtlCol="0">
+            <a:spAutoFit/>
+          </a:bodyPr>
+          <a:lstStyle/>
+          <a:p>
+            <a:r>
+              <a:rPr lang="en-CL" dirty="0">
+                <a:solidFill>
+                  <a:schemeClr val="bg1"/>
+                </a:solidFill>
+              </a:rPr>
+              <a:t>Refuerzo 2</a:t>
+            </a:r>
+          </a:p>
+        </p:txBody>
+      </p:sp>
     </p:spTree>
     <p:extLst>
       <p:ext uri="{BB962C8B-B14F-4D97-AF65-F5344CB8AC3E}">
-        <p14:creationId xmlns:p14="http://schemas.microsoft.com/office/powerpoint/2010/main" val="2319474179"/>
+        <p14:creationId xmlns:p14="http://schemas.microsoft.com/office/powerpoint/2010/main" val="1028022656"/>
       </p:ext>
     </p:extLst>
   </p:cSld>
@@ -7041,10 +7263,10 @@
       </p:grpSpPr>
       <p:pic>
         <p:nvPicPr>
-          <p:cNvPr id="3" name="Picture 2">
-            <a:extLst>
-              <a:ext uri="{FF2B5EF4-FFF2-40B4-BE49-F238E27FC236}">
-                <a16:creationId xmlns:a16="http://schemas.microsoft.com/office/drawing/2014/main" id="{4B7D297A-4D89-6AD4-AB14-56BAF61E359E}"/>
+          <p:cNvPr id="7" name="Picture 6">
+            <a:extLst>
+              <a:ext uri="{FF2B5EF4-FFF2-40B4-BE49-F238E27FC236}">
+                <a16:creationId xmlns:a16="http://schemas.microsoft.com/office/drawing/2014/main" id="{E264D700-71A3-C716-E0ED-C25BC9E24A13}"/>
               </a:ext>
             </a:extLst>
           </p:cNvPr>
@@ -7061,8 +7283,8 @@
         </p:blipFill>
         <p:spPr>
           <a:xfrm>
-            <a:off x="1206500" y="584200"/>
-            <a:ext cx="9779000" cy="5689600"/>
+            <a:off x="1184693" y="746410"/>
+            <a:ext cx="9715500" cy="5524500"/>
           </a:xfrm>
           <a:prstGeom prst="rect">
             <a:avLst/>
@@ -7083,7 +7305,7 @@
         </p:nvSpPr>
         <p:spPr>
           <a:xfrm>
-            <a:off x="-73478" y="0"/>
+            <a:off x="-213426" y="-18007"/>
             <a:ext cx="12338956" cy="569387"/>
           </a:xfrm>
           <a:prstGeom prst="rect">
@@ -7215,10 +7437,10 @@
       </p:sp>
       <p:sp>
         <p:nvSpPr>
-          <p:cNvPr id="6" name="TextBox 5">
-            <a:extLst>
-              <a:ext uri="{FF2B5EF4-FFF2-40B4-BE49-F238E27FC236}">
-                <a16:creationId xmlns:a16="http://schemas.microsoft.com/office/drawing/2014/main" id="{F3DAB039-A99C-1683-729A-B620F140DE6F}"/>
+          <p:cNvPr id="10" name="TextBox 9">
+            <a:extLst>
+              <a:ext uri="{FF2B5EF4-FFF2-40B4-BE49-F238E27FC236}">
+                <a16:creationId xmlns:a16="http://schemas.microsoft.com/office/drawing/2014/main" id="{D337F8C5-C5C6-0CB1-DBB4-CA0755733CFA}"/>
               </a:ext>
             </a:extLst>
           </p:cNvPr>
@@ -7254,10 +7476,10 @@
       </p:sp>
       <p:sp>
         <p:nvSpPr>
-          <p:cNvPr id="8" name="TextBox 7">
-            <a:extLst>
-              <a:ext uri="{FF2B5EF4-FFF2-40B4-BE49-F238E27FC236}">
-                <a16:creationId xmlns:a16="http://schemas.microsoft.com/office/drawing/2014/main" id="{EF1C9CD5-305C-E27D-9785-A6850911553F}"/>
+          <p:cNvPr id="11" name="TextBox 10">
+            <a:extLst>
+              <a:ext uri="{FF2B5EF4-FFF2-40B4-BE49-F238E27FC236}">
+                <a16:creationId xmlns:a16="http://schemas.microsoft.com/office/drawing/2014/main" id="{8210CEF2-C306-E79E-9D58-984AB8456AA0}"/>
               </a:ext>
             </a:extLst>
           </p:cNvPr>
@@ -7293,10 +7515,10 @@
       </p:sp>
       <p:sp>
         <p:nvSpPr>
-          <p:cNvPr id="10" name="TextBox 9">
-            <a:extLst>
-              <a:ext uri="{FF2B5EF4-FFF2-40B4-BE49-F238E27FC236}">
-                <a16:creationId xmlns:a16="http://schemas.microsoft.com/office/drawing/2014/main" id="{FBC66748-E2EF-41D5-A9CC-B3DFE5F373A8}"/>
+          <p:cNvPr id="12" name="TextBox 11">
+            <a:extLst>
+              <a:ext uri="{FF2B5EF4-FFF2-40B4-BE49-F238E27FC236}">
+                <a16:creationId xmlns:a16="http://schemas.microsoft.com/office/drawing/2014/main" id="{DA01B5F6-07F0-CCE3-6F55-8384A7E15FAB}"/>
               </a:ext>
             </a:extLst>
           </p:cNvPr>
@@ -7330,10 +7552,176 @@
           </a:p>
         </p:txBody>
       </p:sp>
+      <p:cxnSp>
+        <p:nvCxnSpPr>
+          <p:cNvPr id="13" name="Straight Arrow Connector 12">
+            <a:extLst>
+              <a:ext uri="{FF2B5EF4-FFF2-40B4-BE49-F238E27FC236}">
+                <a16:creationId xmlns:a16="http://schemas.microsoft.com/office/drawing/2014/main" id="{14753FA5-E2B9-CE31-6163-AE33D96B9B08}"/>
+              </a:ext>
+            </a:extLst>
+          </p:cNvPr>
+          <p:cNvCxnSpPr>
+            <a:cxnSpLocks/>
+          </p:cNvCxnSpPr>
+          <p:nvPr/>
+        </p:nvCxnSpPr>
+        <p:spPr>
+          <a:xfrm>
+            <a:off x="4534277" y="3864751"/>
+            <a:ext cx="3016333" cy="0"/>
+          </a:xfrm>
+          <a:prstGeom prst="straightConnector1">
+            <a:avLst/>
+          </a:prstGeom>
+          <a:ln w="28575">
+            <a:solidFill>
+              <a:schemeClr val="bg1"/>
+            </a:solidFill>
+            <a:tailEnd type="triangle"/>
+          </a:ln>
+        </p:spPr>
+        <p:style>
+          <a:lnRef idx="1">
+            <a:schemeClr val="accent1"/>
+          </a:lnRef>
+          <a:fillRef idx="0">
+            <a:schemeClr val="accent1"/>
+          </a:fillRef>
+          <a:effectRef idx="0">
+            <a:schemeClr val="accent1"/>
+          </a:effectRef>
+          <a:fontRef idx="minor">
+            <a:schemeClr val="tx1"/>
+          </a:fontRef>
+        </p:style>
+      </p:cxnSp>
+      <p:sp>
+        <p:nvSpPr>
+          <p:cNvPr id="17" name="TextBox 16">
+            <a:extLst>
+              <a:ext uri="{FF2B5EF4-FFF2-40B4-BE49-F238E27FC236}">
+                <a16:creationId xmlns:a16="http://schemas.microsoft.com/office/drawing/2014/main" id="{BA664F0C-F3A9-3247-6C6C-0C5A89AC1D84}"/>
+              </a:ext>
+            </a:extLst>
+          </p:cNvPr>
+          <p:cNvSpPr txBox="1"/>
+          <p:nvPr/>
+        </p:nvSpPr>
+        <p:spPr>
+          <a:xfrm>
+            <a:off x="5652752" y="3576284"/>
+            <a:ext cx="779381" cy="307777"/>
+          </a:xfrm>
+          <a:prstGeom prst="rect">
+            <a:avLst/>
+          </a:prstGeom>
+          <a:noFill/>
+        </p:spPr>
+        <p:txBody>
+          <a:bodyPr wrap="none" rtlCol="0">
+            <a:spAutoFit/>
+          </a:bodyPr>
+          <a:lstStyle/>
+          <a:p>
+            <a:r>
+              <a:rPr lang="en-CL" sz="1400" dirty="0">
+                <a:solidFill>
+                  <a:schemeClr val="bg1"/>
+                </a:solidFill>
+              </a:rPr>
+              <a:t>6 meses</a:t>
+            </a:r>
+          </a:p>
+        </p:txBody>
+      </p:sp>
+      <p:cxnSp>
+        <p:nvCxnSpPr>
+          <p:cNvPr id="18" name="Straight Arrow Connector 17">
+            <a:extLst>
+              <a:ext uri="{FF2B5EF4-FFF2-40B4-BE49-F238E27FC236}">
+                <a16:creationId xmlns:a16="http://schemas.microsoft.com/office/drawing/2014/main" id="{3F3D5C4C-4C10-F2F7-B220-CF82A62B008C}"/>
+              </a:ext>
+            </a:extLst>
+          </p:cNvPr>
+          <p:cNvCxnSpPr>
+            <a:cxnSpLocks/>
+          </p:cNvCxnSpPr>
+          <p:nvPr/>
+        </p:nvCxnSpPr>
+        <p:spPr>
+          <a:xfrm>
+            <a:off x="7718333" y="3864751"/>
+            <a:ext cx="3016333" cy="0"/>
+          </a:xfrm>
+          <a:prstGeom prst="straightConnector1">
+            <a:avLst/>
+          </a:prstGeom>
+          <a:ln w="28575">
+            <a:solidFill>
+              <a:schemeClr val="bg1"/>
+            </a:solidFill>
+            <a:tailEnd type="triangle"/>
+          </a:ln>
+        </p:spPr>
+        <p:style>
+          <a:lnRef idx="1">
+            <a:schemeClr val="accent1"/>
+          </a:lnRef>
+          <a:fillRef idx="0">
+            <a:schemeClr val="accent1"/>
+          </a:fillRef>
+          <a:effectRef idx="0">
+            <a:schemeClr val="accent1"/>
+          </a:effectRef>
+          <a:fontRef idx="minor">
+            <a:schemeClr val="tx1"/>
+          </a:fontRef>
+        </p:style>
+      </p:cxnSp>
+      <p:sp>
+        <p:nvSpPr>
+          <p:cNvPr id="19" name="TextBox 18">
+            <a:extLst>
+              <a:ext uri="{FF2B5EF4-FFF2-40B4-BE49-F238E27FC236}">
+                <a16:creationId xmlns:a16="http://schemas.microsoft.com/office/drawing/2014/main" id="{ED6549E2-A725-3CB6-BB87-1935AC444B8A}"/>
+              </a:ext>
+            </a:extLst>
+          </p:cNvPr>
+          <p:cNvSpPr txBox="1"/>
+          <p:nvPr/>
+        </p:nvSpPr>
+        <p:spPr>
+          <a:xfrm>
+            <a:off x="8836808" y="3576284"/>
+            <a:ext cx="779381" cy="307777"/>
+          </a:xfrm>
+          <a:prstGeom prst="rect">
+            <a:avLst/>
+          </a:prstGeom>
+          <a:noFill/>
+        </p:spPr>
+        <p:txBody>
+          <a:bodyPr wrap="none" rtlCol="0">
+            <a:spAutoFit/>
+          </a:bodyPr>
+          <a:lstStyle/>
+          <a:p>
+            <a:r>
+              <a:rPr lang="en-CL" sz="1400" dirty="0">
+                <a:solidFill>
+                  <a:schemeClr val="bg1"/>
+                </a:solidFill>
+              </a:rPr>
+              <a:t>6 meses</a:t>
+            </a:r>
+          </a:p>
+        </p:txBody>
+      </p:sp>
     </p:spTree>
     <p:extLst>
       <p:ext uri="{BB962C8B-B14F-4D97-AF65-F5344CB8AC3E}">
-        <p14:creationId xmlns:p14="http://schemas.microsoft.com/office/powerpoint/2010/main" val="1028022656"/>
+        <p14:creationId xmlns:p14="http://schemas.microsoft.com/office/powerpoint/2010/main" val="1024454853"/>
       </p:ext>
     </p:extLst>
   </p:cSld>
@@ -7360,12 +7748,51 @@
           <a:chExt cx="0" cy="0"/>
         </a:xfrm>
       </p:grpSpPr>
+      <p:sp>
+        <p:nvSpPr>
+          <p:cNvPr id="3" name="TextBox 2">
+            <a:extLst>
+              <a:ext uri="{FF2B5EF4-FFF2-40B4-BE49-F238E27FC236}">
+                <a16:creationId xmlns:a16="http://schemas.microsoft.com/office/drawing/2014/main" id="{1BFE40F7-FB73-FEAE-B569-AB700FD1A2C9}"/>
+              </a:ext>
+            </a:extLst>
+          </p:cNvPr>
+          <p:cNvSpPr txBox="1"/>
+          <p:nvPr/>
+        </p:nvSpPr>
+        <p:spPr>
+          <a:xfrm>
+            <a:off x="2236610" y="0"/>
+            <a:ext cx="7718780" cy="584775"/>
+          </a:xfrm>
+          <a:prstGeom prst="rect">
+            <a:avLst/>
+          </a:prstGeom>
+          <a:noFill/>
+        </p:spPr>
+        <p:txBody>
+          <a:bodyPr wrap="none" rtlCol="0">
+            <a:spAutoFit/>
+          </a:bodyPr>
+          <a:lstStyle/>
+          <a:p>
+            <a:r>
+              <a:rPr lang="en-CL" sz="3200" dirty="0"/>
+              <a:t>Cobertura de vacunación </a:t>
+            </a:r>
+            <a:r>
+              <a:rPr lang="en-CL" sz="3200" b="1" dirty="0"/>
+              <a:t>en últimos 6 meses</a:t>
+            </a:r>
+          </a:p>
+        </p:txBody>
+      </p:sp>
       <p:pic>
         <p:nvPicPr>
-          <p:cNvPr id="7" name="Picture 6">
-            <a:extLst>
-              <a:ext uri="{FF2B5EF4-FFF2-40B4-BE49-F238E27FC236}">
-                <a16:creationId xmlns:a16="http://schemas.microsoft.com/office/drawing/2014/main" id="{E264D700-71A3-C716-E0ED-C25BC9E24A13}"/>
+          <p:cNvPr id="2" name="Picture 1">
+            <a:extLst>
+              <a:ext uri="{FF2B5EF4-FFF2-40B4-BE49-F238E27FC236}">
+                <a16:creationId xmlns:a16="http://schemas.microsoft.com/office/drawing/2014/main" id="{5D3FB194-BE90-9413-2AA5-393EA4C58E1B}"/>
               </a:ext>
             </a:extLst>
           </p:cNvPr>
@@ -7382,445 +7809,18 @@
         </p:blipFill>
         <p:spPr>
           <a:xfrm>
-            <a:off x="1184693" y="746410"/>
-            <a:ext cx="9715500" cy="5524500"/>
+            <a:off x="1746763" y="720242"/>
+            <a:ext cx="8698474" cy="5748292"/>
           </a:xfrm>
           <a:prstGeom prst="rect">
             <a:avLst/>
           </a:prstGeom>
         </p:spPr>
       </p:pic>
-      <p:sp>
-        <p:nvSpPr>
-          <p:cNvPr id="9" name="TextBox 8">
-            <a:extLst>
-              <a:ext uri="{FF2B5EF4-FFF2-40B4-BE49-F238E27FC236}">
-                <a16:creationId xmlns:a16="http://schemas.microsoft.com/office/drawing/2014/main" id="{22433A70-977D-C840-9BCB-9ECF9B80CB77}"/>
-              </a:ext>
-            </a:extLst>
-          </p:cNvPr>
-          <p:cNvSpPr txBox="1"/>
-          <p:nvPr/>
-        </p:nvSpPr>
-        <p:spPr>
-          <a:xfrm>
-            <a:off x="-213426" y="-18007"/>
-            <a:ext cx="12338956" cy="569387"/>
-          </a:xfrm>
-          <a:prstGeom prst="rect">
-            <a:avLst/>
-          </a:prstGeom>
-          <a:noFill/>
-        </p:spPr>
-        <p:txBody>
-          <a:bodyPr wrap="square" rtlCol="0">
-            <a:spAutoFit/>
-          </a:bodyPr>
-          <a:lstStyle/>
-          <a:p>
-            <a:pPr algn="ctr"/>
-            <a:r>
-              <a:rPr lang="en-US" sz="3100" dirty="0" err="1"/>
-              <a:t>Vacunados</a:t>
-            </a:r>
-            <a:r>
-              <a:rPr lang="en-US" sz="3100" dirty="0"/>
-              <a:t> </a:t>
-            </a:r>
-            <a:r>
-              <a:rPr lang="en-US" sz="3100" dirty="0" err="1"/>
-              <a:t>acumulados</a:t>
-            </a:r>
-            <a:endParaRPr lang="en-US" sz="3100" dirty="0"/>
-          </a:p>
-        </p:txBody>
-      </p:sp>
-      <p:sp>
-        <p:nvSpPr>
-          <p:cNvPr id="5" name="TextBox 4">
-            <a:extLst>
-              <a:ext uri="{FF2B5EF4-FFF2-40B4-BE49-F238E27FC236}">
-                <a16:creationId xmlns:a16="http://schemas.microsoft.com/office/drawing/2014/main" id="{AE60033C-48B3-1E42-A180-100FEDC8D62B}"/>
-              </a:ext>
-            </a:extLst>
-          </p:cNvPr>
-          <p:cNvSpPr txBox="1"/>
-          <p:nvPr/>
-        </p:nvSpPr>
-        <p:spPr>
-          <a:xfrm>
-            <a:off x="160256" y="6447934"/>
-            <a:ext cx="5882188" cy="369332"/>
-          </a:xfrm>
-          <a:prstGeom prst="rect">
-            <a:avLst/>
-          </a:prstGeom>
-          <a:noFill/>
-        </p:spPr>
-        <p:txBody>
-          <a:bodyPr wrap="none" rtlCol="0">
-            <a:spAutoFit/>
-          </a:bodyPr>
-          <a:lstStyle/>
-          <a:p>
-            <a:r>
-              <a:rPr lang="en-US" dirty="0"/>
-              <a:t>Fuente: </a:t>
-            </a:r>
-            <a:r>
-              <a:rPr lang="en-US" dirty="0" err="1"/>
-              <a:t>Repositorio</a:t>
-            </a:r>
-            <a:r>
-              <a:rPr lang="en-US" dirty="0"/>
-              <a:t> de </a:t>
-            </a:r>
-            <a:r>
-              <a:rPr lang="en-US" dirty="0" err="1"/>
-              <a:t>Datos</a:t>
-            </a:r>
-            <a:r>
-              <a:rPr lang="en-US" dirty="0"/>
-              <a:t> COVID19, </a:t>
-            </a:r>
-            <a:r>
-              <a:rPr lang="en-US" dirty="0" err="1"/>
-              <a:t>Ministerio</a:t>
-            </a:r>
-            <a:r>
-              <a:rPr lang="en-US" dirty="0"/>
-              <a:t> de </a:t>
-            </a:r>
-            <a:r>
-              <a:rPr lang="en-US" dirty="0" err="1"/>
-              <a:t>Ciencia</a:t>
-            </a:r>
-            <a:endParaRPr lang="en-US" dirty="0"/>
-          </a:p>
-        </p:txBody>
-      </p:sp>
-      <p:sp>
-        <p:nvSpPr>
-          <p:cNvPr id="2" name="TextBox 1">
-            <a:extLst>
-              <a:ext uri="{FF2B5EF4-FFF2-40B4-BE49-F238E27FC236}">
-                <a16:creationId xmlns:a16="http://schemas.microsoft.com/office/drawing/2014/main" id="{FE913D83-78EC-F64F-98C6-1C151ADBA8A9}"/>
-              </a:ext>
-            </a:extLst>
-          </p:cNvPr>
-          <p:cNvSpPr txBox="1"/>
-          <p:nvPr/>
-        </p:nvSpPr>
-        <p:spPr>
-          <a:xfrm>
-            <a:off x="5058039" y="444672"/>
-            <a:ext cx="1968809" cy="461665"/>
-          </a:xfrm>
-          <a:prstGeom prst="rect">
-            <a:avLst/>
-          </a:prstGeom>
-          <a:noFill/>
-        </p:spPr>
-        <p:txBody>
-          <a:bodyPr wrap="none" rtlCol="0">
-            <a:spAutoFit/>
-          </a:bodyPr>
-          <a:lstStyle/>
-          <a:p>
-            <a:r>
-              <a:rPr lang="en-CL" sz="2400" dirty="0"/>
-              <a:t>18 o más años</a:t>
-            </a:r>
-          </a:p>
-        </p:txBody>
-      </p:sp>
-      <p:sp>
-        <p:nvSpPr>
-          <p:cNvPr id="10" name="TextBox 9">
-            <a:extLst>
-              <a:ext uri="{FF2B5EF4-FFF2-40B4-BE49-F238E27FC236}">
-                <a16:creationId xmlns:a16="http://schemas.microsoft.com/office/drawing/2014/main" id="{D337F8C5-C5C6-0CB1-DBB4-CA0755733CFA}"/>
-              </a:ext>
-            </a:extLst>
-          </p:cNvPr>
-          <p:cNvSpPr txBox="1"/>
-          <p:nvPr/>
-        </p:nvSpPr>
-        <p:spPr>
-          <a:xfrm>
-            <a:off x="4358244" y="5438899"/>
-            <a:ext cx="986167" cy="369332"/>
-          </a:xfrm>
-          <a:prstGeom prst="rect">
-            <a:avLst/>
-          </a:prstGeom>
-          <a:noFill/>
-        </p:spPr>
-        <p:txBody>
-          <a:bodyPr wrap="none" rtlCol="0">
-            <a:spAutoFit/>
-          </a:bodyPr>
-          <a:lstStyle/>
-          <a:p>
-            <a:r>
-              <a:rPr lang="en-CL" dirty="0">
-                <a:solidFill>
-                  <a:schemeClr val="bg1"/>
-                </a:solidFill>
-              </a:rPr>
-              <a:t>Primario</a:t>
-            </a:r>
-          </a:p>
-        </p:txBody>
-      </p:sp>
-      <p:sp>
-        <p:nvSpPr>
-          <p:cNvPr id="11" name="TextBox 10">
-            <a:extLst>
-              <a:ext uri="{FF2B5EF4-FFF2-40B4-BE49-F238E27FC236}">
-                <a16:creationId xmlns:a16="http://schemas.microsoft.com/office/drawing/2014/main" id="{8210CEF2-C306-E79E-9D58-984AB8456AA0}"/>
-              </a:ext>
-            </a:extLst>
-          </p:cNvPr>
-          <p:cNvSpPr txBox="1"/>
-          <p:nvPr/>
-        </p:nvSpPr>
-        <p:spPr>
-          <a:xfrm>
-            <a:off x="7414985" y="5438899"/>
-            <a:ext cx="1185004" cy="369332"/>
-          </a:xfrm>
-          <a:prstGeom prst="rect">
-            <a:avLst/>
-          </a:prstGeom>
-          <a:noFill/>
-        </p:spPr>
-        <p:txBody>
-          <a:bodyPr wrap="none" rtlCol="0">
-            <a:spAutoFit/>
-          </a:bodyPr>
-          <a:lstStyle/>
-          <a:p>
-            <a:r>
-              <a:rPr lang="en-CL" dirty="0">
-                <a:solidFill>
-                  <a:schemeClr val="bg1"/>
-                </a:solidFill>
-              </a:rPr>
-              <a:t>Refuerzo 1</a:t>
-            </a:r>
-          </a:p>
-        </p:txBody>
-      </p:sp>
-      <p:sp>
-        <p:nvSpPr>
-          <p:cNvPr id="12" name="TextBox 11">
-            <a:extLst>
-              <a:ext uri="{FF2B5EF4-FFF2-40B4-BE49-F238E27FC236}">
-                <a16:creationId xmlns:a16="http://schemas.microsoft.com/office/drawing/2014/main" id="{DA01B5F6-07F0-CCE3-6F55-8384A7E15FAB}"/>
-              </a:ext>
-            </a:extLst>
-          </p:cNvPr>
-          <p:cNvSpPr txBox="1"/>
-          <p:nvPr/>
-        </p:nvSpPr>
-        <p:spPr>
-          <a:xfrm>
-            <a:off x="9616189" y="5438899"/>
-            <a:ext cx="1185004" cy="369332"/>
-          </a:xfrm>
-          <a:prstGeom prst="rect">
-            <a:avLst/>
-          </a:prstGeom>
-          <a:noFill/>
-        </p:spPr>
-        <p:txBody>
-          <a:bodyPr wrap="none" rtlCol="0">
-            <a:spAutoFit/>
-          </a:bodyPr>
-          <a:lstStyle/>
-          <a:p>
-            <a:r>
-              <a:rPr lang="en-CL" dirty="0">
-                <a:solidFill>
-                  <a:schemeClr val="bg1"/>
-                </a:solidFill>
-              </a:rPr>
-              <a:t>Refuerzo 2</a:t>
-            </a:r>
-          </a:p>
-        </p:txBody>
-      </p:sp>
-      <p:cxnSp>
-        <p:nvCxnSpPr>
-          <p:cNvPr id="13" name="Straight Arrow Connector 12">
-            <a:extLst>
-              <a:ext uri="{FF2B5EF4-FFF2-40B4-BE49-F238E27FC236}">
-                <a16:creationId xmlns:a16="http://schemas.microsoft.com/office/drawing/2014/main" id="{14753FA5-E2B9-CE31-6163-AE33D96B9B08}"/>
-              </a:ext>
-            </a:extLst>
-          </p:cNvPr>
-          <p:cNvCxnSpPr>
-            <a:cxnSpLocks/>
-          </p:cNvCxnSpPr>
-          <p:nvPr/>
-        </p:nvCxnSpPr>
-        <p:spPr>
-          <a:xfrm>
-            <a:off x="4534277" y="3864751"/>
-            <a:ext cx="3016333" cy="0"/>
-          </a:xfrm>
-          <a:prstGeom prst="straightConnector1">
-            <a:avLst/>
-          </a:prstGeom>
-          <a:ln w="28575">
-            <a:solidFill>
-              <a:schemeClr val="bg1"/>
-            </a:solidFill>
-            <a:tailEnd type="triangle"/>
-          </a:ln>
-        </p:spPr>
-        <p:style>
-          <a:lnRef idx="1">
-            <a:schemeClr val="accent1"/>
-          </a:lnRef>
-          <a:fillRef idx="0">
-            <a:schemeClr val="accent1"/>
-          </a:fillRef>
-          <a:effectRef idx="0">
-            <a:schemeClr val="accent1"/>
-          </a:effectRef>
-          <a:fontRef idx="minor">
-            <a:schemeClr val="tx1"/>
-          </a:fontRef>
-        </p:style>
-      </p:cxnSp>
-      <p:sp>
-        <p:nvSpPr>
-          <p:cNvPr id="17" name="TextBox 16">
-            <a:extLst>
-              <a:ext uri="{FF2B5EF4-FFF2-40B4-BE49-F238E27FC236}">
-                <a16:creationId xmlns:a16="http://schemas.microsoft.com/office/drawing/2014/main" id="{BA664F0C-F3A9-3247-6C6C-0C5A89AC1D84}"/>
-              </a:ext>
-            </a:extLst>
-          </p:cNvPr>
-          <p:cNvSpPr txBox="1"/>
-          <p:nvPr/>
-        </p:nvSpPr>
-        <p:spPr>
-          <a:xfrm>
-            <a:off x="5652752" y="3576284"/>
-            <a:ext cx="779381" cy="307777"/>
-          </a:xfrm>
-          <a:prstGeom prst="rect">
-            <a:avLst/>
-          </a:prstGeom>
-          <a:noFill/>
-        </p:spPr>
-        <p:txBody>
-          <a:bodyPr wrap="none" rtlCol="0">
-            <a:spAutoFit/>
-          </a:bodyPr>
-          <a:lstStyle/>
-          <a:p>
-            <a:r>
-              <a:rPr lang="en-CL" sz="1400" dirty="0">
-                <a:solidFill>
-                  <a:schemeClr val="bg1"/>
-                </a:solidFill>
-              </a:rPr>
-              <a:t>6 meses</a:t>
-            </a:r>
-          </a:p>
-        </p:txBody>
-      </p:sp>
-      <p:cxnSp>
-        <p:nvCxnSpPr>
-          <p:cNvPr id="18" name="Straight Arrow Connector 17">
-            <a:extLst>
-              <a:ext uri="{FF2B5EF4-FFF2-40B4-BE49-F238E27FC236}">
-                <a16:creationId xmlns:a16="http://schemas.microsoft.com/office/drawing/2014/main" id="{3F3D5C4C-4C10-F2F7-B220-CF82A62B008C}"/>
-              </a:ext>
-            </a:extLst>
-          </p:cNvPr>
-          <p:cNvCxnSpPr>
-            <a:cxnSpLocks/>
-          </p:cNvCxnSpPr>
-          <p:nvPr/>
-        </p:nvCxnSpPr>
-        <p:spPr>
-          <a:xfrm>
-            <a:off x="7718333" y="3864751"/>
-            <a:ext cx="3016333" cy="0"/>
-          </a:xfrm>
-          <a:prstGeom prst="straightConnector1">
-            <a:avLst/>
-          </a:prstGeom>
-          <a:ln w="28575">
-            <a:solidFill>
-              <a:schemeClr val="bg1"/>
-            </a:solidFill>
-            <a:tailEnd type="triangle"/>
-          </a:ln>
-        </p:spPr>
-        <p:style>
-          <a:lnRef idx="1">
-            <a:schemeClr val="accent1"/>
-          </a:lnRef>
-          <a:fillRef idx="0">
-            <a:schemeClr val="accent1"/>
-          </a:fillRef>
-          <a:effectRef idx="0">
-            <a:schemeClr val="accent1"/>
-          </a:effectRef>
-          <a:fontRef idx="minor">
-            <a:schemeClr val="tx1"/>
-          </a:fontRef>
-        </p:style>
-      </p:cxnSp>
-      <p:sp>
-        <p:nvSpPr>
-          <p:cNvPr id="19" name="TextBox 18">
-            <a:extLst>
-              <a:ext uri="{FF2B5EF4-FFF2-40B4-BE49-F238E27FC236}">
-                <a16:creationId xmlns:a16="http://schemas.microsoft.com/office/drawing/2014/main" id="{ED6549E2-A725-3CB6-BB87-1935AC444B8A}"/>
-              </a:ext>
-            </a:extLst>
-          </p:cNvPr>
-          <p:cNvSpPr txBox="1"/>
-          <p:nvPr/>
-        </p:nvSpPr>
-        <p:spPr>
-          <a:xfrm>
-            <a:off x="8836808" y="3576284"/>
-            <a:ext cx="779381" cy="307777"/>
-          </a:xfrm>
-          <a:prstGeom prst="rect">
-            <a:avLst/>
-          </a:prstGeom>
-          <a:noFill/>
-        </p:spPr>
-        <p:txBody>
-          <a:bodyPr wrap="none" rtlCol="0">
-            <a:spAutoFit/>
-          </a:bodyPr>
-          <a:lstStyle/>
-          <a:p>
-            <a:r>
-              <a:rPr lang="en-CL" sz="1400" dirty="0">
-                <a:solidFill>
-                  <a:schemeClr val="bg1"/>
-                </a:solidFill>
-              </a:rPr>
-              <a:t>6 meses</a:t>
-            </a:r>
-          </a:p>
-        </p:txBody>
-      </p:sp>
     </p:spTree>
     <p:extLst>
       <p:ext uri="{BB962C8B-B14F-4D97-AF65-F5344CB8AC3E}">
-        <p14:creationId xmlns:p14="http://schemas.microsoft.com/office/powerpoint/2010/main" val="1024454853"/>
+        <p14:creationId xmlns:p14="http://schemas.microsoft.com/office/powerpoint/2010/main" val="58329169"/>
       </p:ext>
     </p:extLst>
   </p:cSld>

</xml_diff>